<commit_message>
modified chat window to show online users 1
</commit_message>
<xml_diff>
--- a/Illustrations.pptx
+++ b/Illustrations.pptx
@@ -265,7 +265,7 @@
           <a:p>
             <a:fld id="{2E87C897-2203-447C-8023-8D9097301B59}" type="datetimeFigureOut">
               <a:rPr lang="en-IN" smtClean="0"/>
-              <a:t>20-10-2017</a:t>
+              <a:t>05-11-2017</a:t>
             </a:fld>
             <a:endParaRPr lang="en-IN"/>
           </a:p>
@@ -435,7 +435,7 @@
           <a:p>
             <a:fld id="{2E87C897-2203-447C-8023-8D9097301B59}" type="datetimeFigureOut">
               <a:rPr lang="en-IN" smtClean="0"/>
-              <a:t>20-10-2017</a:t>
+              <a:t>05-11-2017</a:t>
             </a:fld>
             <a:endParaRPr lang="en-IN"/>
           </a:p>
@@ -615,7 +615,7 @@
           <a:p>
             <a:fld id="{2E87C897-2203-447C-8023-8D9097301B59}" type="datetimeFigureOut">
               <a:rPr lang="en-IN" smtClean="0"/>
-              <a:t>20-10-2017</a:t>
+              <a:t>05-11-2017</a:t>
             </a:fld>
             <a:endParaRPr lang="en-IN"/>
           </a:p>
@@ -785,7 +785,7 @@
           <a:p>
             <a:fld id="{2E87C897-2203-447C-8023-8D9097301B59}" type="datetimeFigureOut">
               <a:rPr lang="en-IN" smtClean="0"/>
-              <a:t>20-10-2017</a:t>
+              <a:t>05-11-2017</a:t>
             </a:fld>
             <a:endParaRPr lang="en-IN"/>
           </a:p>
@@ -1029,7 +1029,7 @@
           <a:p>
             <a:fld id="{2E87C897-2203-447C-8023-8D9097301B59}" type="datetimeFigureOut">
               <a:rPr lang="en-IN" smtClean="0"/>
-              <a:t>20-10-2017</a:t>
+              <a:t>05-11-2017</a:t>
             </a:fld>
             <a:endParaRPr lang="en-IN"/>
           </a:p>
@@ -1261,7 +1261,7 @@
           <a:p>
             <a:fld id="{2E87C897-2203-447C-8023-8D9097301B59}" type="datetimeFigureOut">
               <a:rPr lang="en-IN" smtClean="0"/>
-              <a:t>20-10-2017</a:t>
+              <a:t>05-11-2017</a:t>
             </a:fld>
             <a:endParaRPr lang="en-IN"/>
           </a:p>
@@ -1628,7 +1628,7 @@
           <a:p>
             <a:fld id="{2E87C897-2203-447C-8023-8D9097301B59}" type="datetimeFigureOut">
               <a:rPr lang="en-IN" smtClean="0"/>
-              <a:t>20-10-2017</a:t>
+              <a:t>05-11-2017</a:t>
             </a:fld>
             <a:endParaRPr lang="en-IN"/>
           </a:p>
@@ -1746,7 +1746,7 @@
           <a:p>
             <a:fld id="{2E87C897-2203-447C-8023-8D9097301B59}" type="datetimeFigureOut">
               <a:rPr lang="en-IN" smtClean="0"/>
-              <a:t>20-10-2017</a:t>
+              <a:t>05-11-2017</a:t>
             </a:fld>
             <a:endParaRPr lang="en-IN"/>
           </a:p>
@@ -1841,7 +1841,7 @@
           <a:p>
             <a:fld id="{2E87C897-2203-447C-8023-8D9097301B59}" type="datetimeFigureOut">
               <a:rPr lang="en-IN" smtClean="0"/>
-              <a:t>20-10-2017</a:t>
+              <a:t>05-11-2017</a:t>
             </a:fld>
             <a:endParaRPr lang="en-IN"/>
           </a:p>
@@ -2118,7 +2118,7 @@
           <a:p>
             <a:fld id="{2E87C897-2203-447C-8023-8D9097301B59}" type="datetimeFigureOut">
               <a:rPr lang="en-IN" smtClean="0"/>
-              <a:t>20-10-2017</a:t>
+              <a:t>05-11-2017</a:t>
             </a:fld>
             <a:endParaRPr lang="en-IN"/>
           </a:p>
@@ -2375,7 +2375,7 @@
           <a:p>
             <a:fld id="{2E87C897-2203-447C-8023-8D9097301B59}" type="datetimeFigureOut">
               <a:rPr lang="en-IN" smtClean="0"/>
-              <a:t>20-10-2017</a:t>
+              <a:t>05-11-2017</a:t>
             </a:fld>
             <a:endParaRPr lang="en-IN"/>
           </a:p>
@@ -2588,7 +2588,7 @@
           <a:p>
             <a:fld id="{2E87C897-2203-447C-8023-8D9097301B59}" type="datetimeFigureOut">
               <a:rPr lang="en-IN" smtClean="0"/>
-              <a:t>20-10-2017</a:t>
+              <a:t>05-11-2017</a:t>
             </a:fld>
             <a:endParaRPr lang="en-IN"/>
           </a:p>

</xml_diff>